<commit_message>
Some Updates and Graphics Self-Test
</commit_message>
<xml_diff>
--- a/RWorkshopPart1-BasicObjects.pptx
+++ b/RWorkshopPart1-BasicObjects.pptx
@@ -21,8 +21,8 @@
     <p:sldId id="271" r:id="rId12"/>
     <p:sldId id="272" r:id="rId13"/>
     <p:sldId id="258" r:id="rId14"/>
-    <p:sldId id="284" r:id="rId15"/>
-    <p:sldId id="331" r:id="rId16"/>
+    <p:sldId id="364" r:id="rId15"/>
+    <p:sldId id="284" r:id="rId16"/>
     <p:sldId id="285" r:id="rId17"/>
     <p:sldId id="286" r:id="rId18"/>
     <p:sldId id="287" r:id="rId19"/>
@@ -4074,7 +4074,11 @@
             </a:r>
             <a:r>
               <a:rPr lang="en-US" dirty="0" smtClean="0"/>
-              <a:t> - $0.00</a:t>
+              <a:t>* </a:t>
+            </a:r>
+            <a:r>
+              <a:rPr lang="en-US" dirty="0" smtClean="0"/>
+              <a:t>- $0.00</a:t>
             </a:r>
             <a:endParaRPr lang="en-US" dirty="0"/>
           </a:p>
@@ -4218,6 +4222,36 @@
           </a:p>
         </p:txBody>
       </p:sp>
+      <p:sp>
+        <p:nvSpPr>
+          <p:cNvPr id="5" name="TextBox 4"/>
+          <p:cNvSpPr txBox="1"/>
+          <p:nvPr/>
+        </p:nvSpPr>
+        <p:spPr>
+          <a:xfrm>
+            <a:off x="762000" y="6216134"/>
+            <a:ext cx="2613536" cy="369332"/>
+          </a:xfrm>
+          <a:prstGeom prst="rect">
+            <a:avLst/>
+          </a:prstGeom>
+          <a:noFill/>
+        </p:spPr>
+        <p:txBody>
+          <a:bodyPr wrap="none" rtlCol="0">
+            <a:spAutoFit/>
+          </a:bodyPr>
+          <a:lstStyle/>
+          <a:p>
+            <a:r>
+              <a:rPr lang="en-US" dirty="0" smtClean="0"/>
+              <a:t>* The free version, anyway</a:t>
+            </a:r>
+            <a:endParaRPr lang="en-US" dirty="0"/>
+          </a:p>
+        </p:txBody>
+      </p:sp>
     </p:spTree>
     <p:extLst>
       <p:ext uri="{BB962C8B-B14F-4D97-AF65-F5344CB8AC3E}">
@@ -4315,19 +4349,7 @@
             <a:pPr lvl="1"/>
             <a:r>
               <a:rPr lang="en-US" dirty="0" smtClean="0"/>
-              <a:t>But the R community </a:t>
-            </a:r>
-            <a:r>
-              <a:rPr lang="en-US" dirty="0" smtClean="0"/>
-              <a:t>is </a:t>
-            </a:r>
-            <a:r>
-              <a:rPr lang="en-US" dirty="0" smtClean="0"/>
-              <a:t>working on </a:t>
-            </a:r>
-            <a:r>
-              <a:rPr lang="en-US" dirty="0" smtClean="0"/>
-              <a:t>this</a:t>
+              <a:t>But the R community is working on this</a:t>
             </a:r>
             <a:endParaRPr lang="en-US" dirty="0"/>
           </a:p>
@@ -4387,7 +4409,7 @@
           <a:p>
             <a:r>
               <a:rPr lang="en-US" dirty="0" smtClean="0"/>
-              <a:t>Basics/Process</a:t>
+              <a:t>Basics</a:t>
             </a:r>
             <a:endParaRPr lang="en-US" dirty="0"/>
           </a:p>
@@ -4411,13 +4433,25 @@
         </p:spPr>
         <p:txBody>
           <a:bodyPr>
-            <a:normAutofit fontScale="77500" lnSpcReduction="20000"/>
+            <a:normAutofit/>
           </a:bodyPr>
           <a:lstStyle/>
           <a:p>
             <a:r>
               <a:rPr lang="en-US" dirty="0" smtClean="0"/>
-              <a:t>People learn best by doing … but lectures are the opposite of doing</a:t>
+              <a:t>People learn best by doing … but </a:t>
+            </a:r>
+            <a:r>
+              <a:rPr lang="en-US" dirty="0" smtClean="0"/>
+              <a:t>the goal here is to impart my knowledge to you and listening to </a:t>
+            </a:r>
+            <a:r>
+              <a:rPr lang="en-US" dirty="0" smtClean="0"/>
+              <a:t>lectures is not </a:t>
+            </a:r>
+            <a:r>
+              <a:rPr lang="en-US" dirty="0" smtClean="0"/>
+              <a:t>doing</a:t>
             </a:r>
           </a:p>
           <a:p>
@@ -4426,46 +4460,23 @@
           <a:p>
             <a:r>
               <a:rPr lang="en-US" dirty="0" smtClean="0"/>
-              <a:t>The goal of this time: to give you the tools to overcome hurdles on your own</a:t>
-            </a:r>
-          </a:p>
-          <a:p>
-            <a:endParaRPr lang="en-US" dirty="0"/>
-          </a:p>
-          <a:p>
-            <a:r>
-              <a:rPr lang="en-US" dirty="0" smtClean="0"/>
-              <a:t>Generally, I'll talk/demo for a little while, then challenge you to write code yourself</a:t>
-            </a:r>
-          </a:p>
-          <a:p>
-            <a:endParaRPr lang="en-US" dirty="0"/>
-          </a:p>
-          <a:p>
-            <a:r>
-              <a:rPr lang="en-US" dirty="0"/>
-              <a:t>Because some people will finish </a:t>
-            </a:r>
-            <a:r>
-              <a:rPr lang="en-US" dirty="0" smtClean="0"/>
-              <a:t>challenges earlier </a:t>
-            </a:r>
-            <a:r>
-              <a:rPr lang="en-US" dirty="0"/>
-              <a:t>than others, I will often suggest self-test problems to test </a:t>
-            </a:r>
-            <a:r>
-              <a:rPr lang="en-US" dirty="0" smtClean="0"/>
-              <a:t>another aspect of the lecture in case you </a:t>
-            </a:r>
-            <a:r>
-              <a:rPr lang="en-US" dirty="0"/>
-              <a:t>find yourself </a:t>
-            </a:r>
-            <a:r>
-              <a:rPr lang="en-US" dirty="0" smtClean="0"/>
-              <a:t>waiting.  Questions and answers are in the handout</a:t>
-            </a:r>
+              <a:t>My goal: </a:t>
+            </a:r>
+            <a:r>
+              <a:rPr lang="en-US" dirty="0" smtClean="0"/>
+              <a:t>to give you the tools to overcome hurdles on your </a:t>
+            </a:r>
+            <a:r>
+              <a:rPr lang="en-US" dirty="0" smtClean="0"/>
+              <a:t>own, which will be a mix of guided doing, printed materials, and pointing to </a:t>
+            </a:r>
+            <a:r>
+              <a:rPr lang="en-US" smtClean="0"/>
+              <a:t>Stack Overflow</a:t>
+            </a:r>
+            <a:endParaRPr lang="en-US" dirty="0" smtClean="0"/>
+          </a:p>
+          <a:p>
             <a:endParaRPr lang="en-US" dirty="0"/>
           </a:p>
           <a:p>
@@ -4522,47 +4533,49 @@
         </p:nvSpPr>
         <p:spPr/>
         <p:txBody>
+          <a:bodyPr/>
+          <a:lstStyle/>
+          <a:p>
+            <a:r>
+              <a:rPr lang="en-US" dirty="0" smtClean="0"/>
+              <a:t>Process</a:t>
+            </a:r>
+            <a:endParaRPr lang="en-US" dirty="0"/>
+          </a:p>
+        </p:txBody>
+      </p:sp>
+      <p:sp>
+        <p:nvSpPr>
+          <p:cNvPr id="3" name="Content Placeholder 2"/>
+          <p:cNvSpPr>
+            <a:spLocks noGrp="1"/>
+          </p:cNvSpPr>
+          <p:nvPr>
+            <p:ph idx="1"/>
+          </p:nvPr>
+        </p:nvSpPr>
+        <p:spPr/>
+        <p:txBody>
           <a:bodyPr>
-            <a:normAutofit/>
+            <a:normAutofit lnSpcReduction="10000"/>
           </a:bodyPr>
           <a:lstStyle/>
           <a:p>
             <a:r>
-              <a:rPr lang="en-US" dirty="0" smtClean="0"/>
-              <a:t>Orientation</a:t>
-            </a:r>
+              <a:rPr lang="en-US" dirty="0"/>
+              <a:t>Generally, I'll talk/demo interactively for a little while, then challenge you to write some code yourself</a:t>
+            </a:r>
+          </a:p>
+          <a:p>
             <a:endParaRPr lang="en-US" dirty="0"/>
           </a:p>
-        </p:txBody>
-      </p:sp>
-      <p:sp>
-        <p:nvSpPr>
-          <p:cNvPr id="3" name="Content Placeholder 2"/>
-          <p:cNvSpPr>
-            <a:spLocks noGrp="1"/>
-          </p:cNvSpPr>
-          <p:nvPr>
-            <p:ph idx="1"/>
-          </p:nvPr>
-        </p:nvSpPr>
-        <p:spPr/>
-        <p:txBody>
-          <a:bodyPr/>
-          <a:lstStyle/>
-          <a:p>
-            <a:r>
-              <a:rPr lang="en-US" dirty="0" smtClean="0"/>
-              <a:t>Open WorkshopSession1.R from the file share</a:t>
-            </a:r>
-          </a:p>
-          <a:p>
-            <a:endParaRPr lang="en-US" dirty="0"/>
-          </a:p>
-          <a:p>
-            <a:r>
-              <a:rPr lang="en-US" dirty="0" smtClean="0"/>
-              <a:t>Let's switch to R for a bit here…</a:t>
-            </a:r>
+          <a:p>
+            <a:r>
+              <a:rPr lang="en-US" dirty="0"/>
+              <a:t>Because some people will finish challenges earlier than others, I will often suggest self-test problems to test another aspect of the lecture in case you find yourself waiting.  Self-test questions and answers are in the handout</a:t>
+            </a:r>
+          </a:p>
+          <a:p>
             <a:endParaRPr lang="en-US" dirty="0"/>
           </a:p>
         </p:txBody>
@@ -4570,20 +4583,13 @@
     </p:spTree>
     <p:extLst>
       <p:ext uri="{BB962C8B-B14F-4D97-AF65-F5344CB8AC3E}">
-        <p14:creationId xmlns:p14="http://schemas.microsoft.com/office/powerpoint/2010/main" val="36634223"/>
+        <p14:creationId xmlns:p14="http://schemas.microsoft.com/office/powerpoint/2010/main" val="184220676"/>
       </p:ext>
     </p:extLst>
   </p:cSld>
   <p:clrMapOvr>
     <a:masterClrMapping/>
   </p:clrMapOvr>
-  <p:timing>
-    <p:tnLst>
-      <p:par>
-        <p:cTn id="1" dur="indefinite" restart="never" nodeType="tmRoot"/>
-      </p:par>
-    </p:tnLst>
-  </p:timing>
 </p:sld>
 </file>
 
@@ -4616,75 +4622,46 @@
         </p:nvSpPr>
         <p:spPr/>
         <p:txBody>
+          <a:bodyPr>
+            <a:normAutofit/>
+          </a:bodyPr>
+          <a:lstStyle/>
+          <a:p>
+            <a:r>
+              <a:rPr lang="en-US" dirty="0" smtClean="0"/>
+              <a:t>Orientation</a:t>
+            </a:r>
+            <a:endParaRPr lang="en-US" dirty="0"/>
+          </a:p>
+        </p:txBody>
+      </p:sp>
+      <p:sp>
+        <p:nvSpPr>
+          <p:cNvPr id="3" name="Content Placeholder 2"/>
+          <p:cNvSpPr>
+            <a:spLocks noGrp="1"/>
+          </p:cNvSpPr>
+          <p:nvPr>
+            <p:ph idx="1"/>
+          </p:nvPr>
+        </p:nvSpPr>
+        <p:spPr/>
+        <p:txBody>
           <a:bodyPr/>
           <a:lstStyle/>
           <a:p>
             <a:r>
               <a:rPr lang="en-US" dirty="0" smtClean="0"/>
-              <a:t>Agenda</a:t>
-            </a:r>
+              <a:t>Open WorkshopSession1.R from the file share</a:t>
+            </a:r>
+          </a:p>
+          <a:p>
             <a:endParaRPr lang="en-US" dirty="0"/>
           </a:p>
-        </p:txBody>
-      </p:sp>
-      <p:sp>
-        <p:nvSpPr>
-          <p:cNvPr id="3" name="Content Placeholder 2"/>
-          <p:cNvSpPr>
-            <a:spLocks noGrp="1"/>
-          </p:cNvSpPr>
-          <p:nvPr>
-            <p:ph idx="1"/>
-          </p:nvPr>
-        </p:nvSpPr>
-        <p:spPr/>
-        <p:txBody>
-          <a:bodyPr/>
-          <a:lstStyle/>
-          <a:p>
-            <a:r>
-              <a:rPr lang="en-US" dirty="0" smtClean="0"/>
-              <a:t>Basic R </a:t>
-            </a:r>
-            <a:r>
-              <a:rPr lang="en-US" smtClean="0"/>
-              <a:t>object types</a:t>
-            </a:r>
-            <a:endParaRPr lang="en-US" dirty="0" smtClean="0"/>
-          </a:p>
-          <a:p>
-            <a:pPr lvl="1"/>
-            <a:r>
-              <a:rPr lang="en-US" dirty="0" smtClean="0"/>
-              <a:t>Vector</a:t>
-            </a:r>
-          </a:p>
-          <a:p>
-            <a:pPr lvl="1"/>
-            <a:r>
-              <a:rPr lang="en-US" dirty="0" smtClean="0"/>
-              <a:t>Matrix</a:t>
-            </a:r>
-          </a:p>
-          <a:p>
-            <a:pPr lvl="1"/>
-            <a:r>
-              <a:rPr lang="en-US" dirty="0" smtClean="0"/>
-              <a:t>Array</a:t>
-            </a:r>
-          </a:p>
-          <a:p>
-            <a:pPr lvl="1"/>
-            <a:r>
-              <a:rPr lang="en-US" dirty="0" smtClean="0"/>
-              <a:t>List</a:t>
-            </a:r>
-          </a:p>
-          <a:p>
-            <a:pPr lvl="1"/>
-            <a:r>
-              <a:rPr lang="en-US" dirty="0" smtClean="0"/>
-              <a:t>Data Frame</a:t>
+          <a:p>
+            <a:r>
+              <a:rPr lang="en-US" dirty="0" smtClean="0"/>
+              <a:t>Let's switch to R for a bit here…</a:t>
             </a:r>
             <a:endParaRPr lang="en-US" dirty="0"/>
           </a:p>
@@ -4693,13 +4670,20 @@
     </p:spTree>
     <p:extLst>
       <p:ext uri="{BB962C8B-B14F-4D97-AF65-F5344CB8AC3E}">
-        <p14:creationId xmlns:p14="http://schemas.microsoft.com/office/powerpoint/2010/main" val="1844206997"/>
+        <p14:creationId xmlns:p14="http://schemas.microsoft.com/office/powerpoint/2010/main" val="36634223"/>
       </p:ext>
     </p:extLst>
   </p:cSld>
   <p:clrMapOvr>
     <a:masterClrMapping/>
   </p:clrMapOvr>
+  <p:timing>
+    <p:tnLst>
+      <p:par>
+        <p:cTn id="1" dur="indefinite" restart="never" nodeType="tmRoot"/>
+      </p:par>
+    </p:tnLst>
+  </p:timing>
 </p:sld>
 </file>
 
@@ -8222,11 +8206,7 @@
           <a:p>
             <a:r>
               <a:rPr lang="en-US" dirty="0" smtClean="0"/>
-              <a:t>More </a:t>
-            </a:r>
-            <a:r>
-              <a:rPr lang="en-US" dirty="0" smtClean="0"/>
-              <a:t>building blocks</a:t>
+              <a:t>More building blocks</a:t>
             </a:r>
             <a:endParaRPr lang="en-US" dirty="0"/>
           </a:p>
@@ -8256,15 +8236,7 @@
           <a:p>
             <a:r>
               <a:rPr lang="en-US" dirty="0" smtClean="0"/>
-              <a:t>Array: A 3- (or </a:t>
-            </a:r>
-            <a:r>
-              <a:rPr lang="en-US" dirty="0" smtClean="0"/>
-              <a:t>more-) </a:t>
-            </a:r>
-            <a:r>
-              <a:rPr lang="en-US" dirty="0" smtClean="0"/>
-              <a:t>dimensional collection of like elements</a:t>
+              <a:t>Array: A 3- (or more-) dimensional collection of like elements</a:t>
             </a:r>
           </a:p>
           <a:p>
@@ -9008,13 +8980,8 @@
           <a:p>
             <a:r>
               <a:rPr lang="en-US" dirty="0" smtClean="0"/>
-              <a:t>Function for creating arrays: </a:t>
-            </a:r>
-            <a:r>
-              <a:rPr lang="en-US" dirty="0" smtClean="0"/>
-              <a:t>array()</a:t>
-            </a:r>
-            <a:endParaRPr lang="en-US" dirty="0" smtClean="0"/>
+              <a:t>Function for creating arrays: array()</a:t>
+            </a:r>
           </a:p>
           <a:p>
             <a:endParaRPr lang="en-US" dirty="0" smtClean="0"/>
@@ -9026,11 +8993,7 @@
             </a:r>
             <a:r>
               <a:rPr lang="en-US" dirty="0" smtClean="0"/>
-              <a:t> &lt;- array(1:12 dim=c(2, 3, 2</a:t>
-            </a:r>
-            <a:r>
-              <a:rPr lang="en-US" dirty="0" smtClean="0"/>
-              <a:t>))</a:t>
+              <a:t> &lt;- array(1:12 dim=c(2, 3, 2))</a:t>
             </a:r>
             <a:endParaRPr lang="en-US" dirty="0"/>
           </a:p>
@@ -9889,17 +9852,12 @@
               <a:rPr lang="en-US" dirty="0" smtClean="0"/>
               <a:t>Dim specifies dimensions</a:t>
             </a:r>
-            <a:endParaRPr lang="en-US" dirty="0" smtClean="0"/>
           </a:p>
           <a:p>
             <a:pPr lvl="1"/>
             <a:r>
               <a:rPr lang="en-US" dirty="0" smtClean="0"/>
-              <a:t>array(1:12, dim=c(3,2,2</a:t>
-            </a:r>
-            <a:r>
-              <a:rPr lang="en-US" dirty="0" smtClean="0"/>
-              <a:t>))</a:t>
+              <a:t>array(1:12, dim=c(3,2,2))</a:t>
             </a:r>
           </a:p>
           <a:p>
@@ -10205,11 +10163,7 @@
           <a:p>
             <a:r>
               <a:rPr lang="en-US" dirty="0"/>
-              <a:t>(Bonus: self-test # </a:t>
-            </a:r>
-            <a:r>
-              <a:rPr lang="en-US" dirty="0"/>
-              <a:t>3</a:t>
+              <a:t>(Bonus: self-test # 3</a:t>
             </a:r>
             <a:r>
               <a:rPr lang="en-US" dirty="0" smtClean="0"/>
@@ -15699,13 +15653,8 @@
           <a:p>
             <a:r>
               <a:rPr lang="en-US" dirty="0" smtClean="0"/>
-              <a:t>Usually, load from CSV or subset from data frame loaded from CSV </a:t>
-            </a:r>
-            <a:r>
-              <a:rPr lang="en-US" dirty="0" smtClean="0"/>
-              <a:t>(loading data coming up…)</a:t>
-            </a:r>
-            <a:endParaRPr lang="en-US" dirty="0" smtClean="0"/>
+              <a:t>Usually, load from CSV or subset from data frame loaded from CSV (loading data coming up…)</a:t>
+            </a:r>
           </a:p>
           <a:p>
             <a:endParaRPr lang="en-US" dirty="0" smtClean="0"/>
@@ -16248,11 +16197,7 @@
           <a:p>
             <a:r>
               <a:rPr lang="en-US" dirty="0" smtClean="0"/>
-              <a:t>We'll go into more detail on data frames </a:t>
-            </a:r>
-            <a:r>
-              <a:rPr lang="en-US" dirty="0" smtClean="0"/>
-              <a:t>after the break</a:t>
+              <a:t>We'll go into more detail on data frames after the break</a:t>
             </a:r>
             <a:endParaRPr lang="en-US" dirty="0"/>
           </a:p>
@@ -16463,11 +16408,7 @@
             </a:br>
             <a:r>
               <a:rPr lang="en-US" dirty="0" smtClean="0"/>
-              <a:t>Basic Object </a:t>
-            </a:r>
-            <a:r>
-              <a:rPr lang="en-US" dirty="0" smtClean="0"/>
-              <a:t>Types for Epidemiologists</a:t>
+              <a:t>Basic Object Types for Epidemiologists</a:t>
             </a:r>
             <a:endParaRPr lang="en-US" dirty="0"/>
           </a:p>
@@ -16496,36 +16437,19 @@
           <a:p>
             <a:r>
               <a:rPr lang="en-US" dirty="0" smtClean="0"/>
-              <a:t>Matrix</a:t>
-            </a:r>
-            <a:r>
-              <a:rPr lang="en-US" dirty="0" smtClean="0"/>
-              <a:t>: contingency (2x2) tables</a:t>
-            </a:r>
-          </a:p>
-          <a:p>
-            <a:r>
-              <a:rPr lang="en-US" dirty="0" smtClean="0"/>
-              <a:t>Arrays: stratified </a:t>
-            </a:r>
-            <a:r>
-              <a:rPr lang="en-US" dirty="0" smtClean="0"/>
-              <a:t>analysis results</a:t>
-            </a:r>
-            <a:endParaRPr lang="en-US" dirty="0" smtClean="0"/>
-          </a:p>
-          <a:p>
-            <a:r>
-              <a:rPr lang="en-US" dirty="0" smtClean="0"/>
-              <a:t>Data Frames: </a:t>
-            </a:r>
-            <a:r>
-              <a:rPr lang="en-US" dirty="0" smtClean="0"/>
-              <a:t>observations </a:t>
-            </a:r>
-            <a:r>
-              <a:rPr lang="en-US" dirty="0" smtClean="0"/>
-              <a:t>and variables</a:t>
+              <a:t>Matrix: contingency (2x2) tables</a:t>
+            </a:r>
+          </a:p>
+          <a:p>
+            <a:r>
+              <a:rPr lang="en-US" dirty="0" smtClean="0"/>
+              <a:t>Arrays: stratified analysis results</a:t>
+            </a:r>
+          </a:p>
+          <a:p>
+            <a:r>
+              <a:rPr lang="en-US" dirty="0" smtClean="0"/>
+              <a:t>Data Frames: observations and variables</a:t>
             </a:r>
           </a:p>
           <a:p>

</xml_diff>